<commit_message>
Updated Presentation on Code Quality
</commit_message>
<xml_diff>
--- a/Code quality Vikrant Singh.pptx
+++ b/Code quality Vikrant Singh.pptx
@@ -127,6 +127,11 @@
       </a:defRPr>
     </a:lvl9pPr>
   </p:defaultTextStyle>
+  <p:extLst>
+    <p:ext uri="{EFAFB233-063F-42B5-8137-9DF3F51BA10A}">
+      <p15:sldGuideLst xmlns:p15="http://schemas.microsoft.com/office/powerpoint/2012/main"/>
+    </p:ext>
+  </p:extLst>
 </p:presentation>
 </file>
 
@@ -16142,7 +16147,7 @@
           <a:p>
             <a:fld id="{071A6A20-DA29-4A2B-9475-6A87D9899C2B}" type="datetimeFigureOut">
               <a:rPr lang="en-US" smtClean="0"/>
-              <a:t>5/7/2020</a:t>
+              <a:t>5/8/2020</a:t>
             </a:fld>
             <a:endParaRPr lang="en-US"/>
           </a:p>
@@ -17103,7 +17108,7 @@
           <a:p>
             <a:fld id="{82EDB8D0-98ED-4B86-9D5F-E61ADC70144D}" type="datetimeFigureOut">
               <a:rPr lang="en-US" smtClean="0"/>
-              <a:t>5/7/2020</a:t>
+              <a:t>5/8/2020</a:t>
             </a:fld>
             <a:endParaRPr lang="en-US" dirty="0"/>
           </a:p>
@@ -17518,7 +17523,7 @@
           <a:p>
             <a:fld id="{82EDB8D0-98ED-4B86-9D5F-E61ADC70144D}" type="datetimeFigureOut">
               <a:rPr lang="en-US" smtClean="0"/>
-              <a:t>5/7/2020</a:t>
+              <a:t>5/8/2020</a:t>
             </a:fld>
             <a:endParaRPr lang="en-US"/>
           </a:p>
@@ -18010,7 +18015,7 @@
           <a:p>
             <a:fld id="{82EDB8D0-98ED-4B86-9D5F-E61ADC70144D}" type="datetimeFigureOut">
               <a:rPr lang="en-US" smtClean="0"/>
-              <a:t>5/7/2020</a:t>
+              <a:t>5/8/2020</a:t>
             </a:fld>
             <a:endParaRPr lang="en-US"/>
           </a:p>
@@ -18497,7 +18502,7 @@
           <a:p>
             <a:fld id="{82EDB8D0-98ED-4B86-9D5F-E61ADC70144D}" type="datetimeFigureOut">
               <a:rPr lang="en-US" smtClean="0"/>
-              <a:t>5/7/2020</a:t>
+              <a:t>5/8/2020</a:t>
             </a:fld>
             <a:endParaRPr lang="en-US" dirty="0"/>
           </a:p>
@@ -19266,7 +19271,7 @@
           <a:p>
             <a:fld id="{82EDB8D0-98ED-4B86-9D5F-E61ADC70144D}" type="datetimeFigureOut">
               <a:rPr lang="en-US" smtClean="0"/>
-              <a:t>5/7/2020</a:t>
+              <a:t>5/8/2020</a:t>
             </a:fld>
             <a:endParaRPr lang="en-US"/>
           </a:p>
@@ -19748,7 +19753,7 @@
           <a:p>
             <a:fld id="{82EDB8D0-98ED-4B86-9D5F-E61ADC70144D}" type="datetimeFigureOut">
               <a:rPr lang="en-US" smtClean="0"/>
-              <a:t>5/7/2020</a:t>
+              <a:t>5/8/2020</a:t>
             </a:fld>
             <a:endParaRPr lang="en-US"/>
           </a:p>
@@ -20444,7 +20449,7 @@
           <a:p>
             <a:fld id="{82EDB8D0-98ED-4B86-9D5F-E61ADC70144D}" type="datetimeFigureOut">
               <a:rPr lang="en-US" smtClean="0"/>
-              <a:t>5/7/2020</a:t>
+              <a:t>5/8/2020</a:t>
             </a:fld>
             <a:endParaRPr lang="en-US"/>
           </a:p>
@@ -20869,7 +20874,7 @@
           <a:p>
             <a:fld id="{82EDB8D0-98ED-4B86-9D5F-E61ADC70144D}" type="datetimeFigureOut">
               <a:rPr lang="en-US" smtClean="0"/>
-              <a:t>5/7/2020</a:t>
+              <a:t>5/8/2020</a:t>
             </a:fld>
             <a:endParaRPr lang="en-US"/>
           </a:p>
@@ -21266,7 +21271,7 @@
           <a:p>
             <a:fld id="{82EDB8D0-98ED-4B86-9D5F-E61ADC70144D}" type="datetimeFigureOut">
               <a:rPr lang="en-US" smtClean="0"/>
-              <a:t>5/7/2020</a:t>
+              <a:t>5/8/2020</a:t>
             </a:fld>
             <a:endParaRPr lang="en-US"/>
           </a:p>
@@ -21861,7 +21866,7 @@
           <a:p>
             <a:fld id="{82EDB8D0-98ED-4B86-9D5F-E61ADC70144D}" type="datetimeFigureOut">
               <a:rPr lang="en-US" smtClean="0"/>
-              <a:t>5/7/2020</a:t>
+              <a:t>5/8/2020</a:t>
             </a:fld>
             <a:endParaRPr lang="en-US"/>
           </a:p>
@@ -22436,7 +22441,7 @@
           <a:p>
             <a:fld id="{82EDB8D0-98ED-4B86-9D5F-E61ADC70144D}" type="datetimeFigureOut">
               <a:rPr lang="en-US" smtClean="0"/>
-              <a:t>5/7/2020</a:t>
+              <a:t>5/8/2020</a:t>
             </a:fld>
             <a:endParaRPr lang="en-US"/>
           </a:p>
@@ -22963,7 +22968,7 @@
             <a:fld id="{82EDB8D0-98ED-4B86-9D5F-E61ADC70144D}" type="datetimeFigureOut">
               <a:rPr lang="en-US" smtClean="0"/>
               <a:pPr/>
-              <a:t>5/7/2020</a:t>
+              <a:t>5/8/2020</a:t>
             </a:fld>
             <a:endParaRPr lang="en-US" dirty="0"/>
           </a:p>
@@ -26851,66 +26856,82 @@
           </a:xfrm>
         </p:spPr>
         <p:txBody>
-          <a:bodyPr/>
+          <a:bodyPr>
+            <a:normAutofit/>
+          </a:bodyPr>
           <a:lstStyle/>
           <a:p>
             <a:r>
-              <a:rPr lang="en-US" dirty="0"/>
+              <a:rPr lang="en-US" sz="2400" dirty="0"/>
               <a:t>Delete Unused Variables.</a:t>
             </a:r>
           </a:p>
           <a:p>
             <a:r>
-              <a:rPr lang="en-US" dirty="0"/>
+              <a:rPr lang="en-US" sz="2400" dirty="0">
+                <a:solidFill>
+                  <a:srgbClr val="00B050"/>
+                </a:solidFill>
+              </a:rPr>
+              <a:t>@Override</a:t>
+            </a:r>
+            <a:r>
+              <a:rPr lang="en-US" sz="2400" dirty="0"/>
+              <a:t>: always use.</a:t>
+            </a:r>
+          </a:p>
+          <a:p>
+            <a:r>
+              <a:rPr lang="en-US" sz="2400" dirty="0"/>
               <a:t>Parentheses </a:t>
             </a:r>
           </a:p>
           <a:p>
             <a:r>
-              <a:rPr lang="en-US" dirty="0"/>
+              <a:rPr lang="en-US" sz="2400" dirty="0"/>
               <a:t>Write Generic and Re-useable Code .</a:t>
             </a:r>
             <a:br>
-              <a:rPr lang="en-US" dirty="0"/>
+              <a:rPr lang="en-US" sz="2400" dirty="0"/>
             </a:br>
             <a:r>
-              <a:rPr lang="en-US" dirty="0"/>
+              <a:rPr lang="en-US" sz="2400" dirty="0"/>
               <a:t>If a particular code is getting used too often ,wrap that in a method.</a:t>
             </a:r>
           </a:p>
           <a:p>
             <a:r>
-              <a:rPr lang="en-US" dirty="0"/>
+              <a:rPr lang="en-US" sz="2400" dirty="0"/>
               <a:t>Less lines ,More Classes.</a:t>
             </a:r>
           </a:p>
           <a:p>
             <a:r>
-              <a:rPr lang="en-US" dirty="0"/>
+              <a:rPr lang="en-US" sz="2400" dirty="0"/>
               <a:t>Use Enums wherever possible.</a:t>
             </a:r>
           </a:p>
           <a:p>
             <a:r>
-              <a:rPr lang="en-US" dirty="0"/>
+              <a:rPr lang="en-US" sz="2400" dirty="0"/>
               <a:t>Write Unit Tests. </a:t>
             </a:r>
           </a:p>
           <a:p>
             <a:r>
-              <a:rPr lang="en-US" dirty="0"/>
-              <a:t>Hard Code as less as possible.</a:t>
+              <a:rPr lang="en-US" sz="2400" dirty="0"/>
+              <a:t>Hard-Code as less as possible.</a:t>
             </a:r>
             <a:r>
-              <a:rPr lang="en-US" sz="1600" i="1" dirty="0"/>
+              <a:rPr lang="en-US" sz="1400" i="1" dirty="0"/>
               <a:t>(</a:t>
             </a:r>
             <a:r>
-              <a:rPr lang="en-US" sz="1600" i="1" dirty="0" err="1"/>
+              <a:rPr lang="en-US" sz="1400" i="1" dirty="0" err="1"/>
               <a:t>Esp</a:t>
             </a:r>
             <a:r>
-              <a:rPr lang="en-US" sz="1600" i="1" dirty="0"/>
+              <a:rPr lang="en-US" sz="1400" i="1" dirty="0"/>
               <a:t> for UI-Design Implementation)</a:t>
             </a:r>
           </a:p>
@@ -27094,7 +27115,11 @@
                                           </p:stCondLst>
                                         </p:cTn>
                                         <p:tgtEl>
-                                          <p:spTgt spid="5"/>
+                                          <p:spTgt spid="3">
+                                            <p:txEl>
+                                              <p:pRg st="2" end="2"/>
+                                            </p:txEl>
+                                          </p:spTgt>
                                         </p:tgtEl>
                                         <p:attrNameLst>
                                           <p:attrName>style.visibility</p:attrName>
@@ -27126,14 +27151,59 @@
                             </p:stCondLst>
                             <p:childTnLst>
                               <p:par>
-                                <p:cTn id="17" presetID="10" presetClass="exit" presetSubtype="0" fill="hold" nodeType="clickEffect">
+                                <p:cTn id="17" presetID="1" presetClass="entr" presetSubtype="0" fill="hold" nodeType="clickEffect">
+                                  <p:stCondLst>
+                                    <p:cond delay="0"/>
+                                  </p:stCondLst>
+                                  <p:childTnLst>
+                                    <p:set>
+                                      <p:cBhvr>
+                                        <p:cTn id="18" dur="1" fill="hold">
+                                          <p:stCondLst>
+                                            <p:cond delay="0"/>
+                                          </p:stCondLst>
+                                        </p:cTn>
+                                        <p:tgtEl>
+                                          <p:spTgt spid="5"/>
+                                        </p:tgtEl>
+                                        <p:attrNameLst>
+                                          <p:attrName>style.visibility</p:attrName>
+                                        </p:attrNameLst>
+                                      </p:cBhvr>
+                                      <p:to>
+                                        <p:strVal val="visible"/>
+                                      </p:to>
+                                    </p:set>
+                                  </p:childTnLst>
+                                </p:cTn>
+                              </p:par>
+                            </p:childTnLst>
+                          </p:cTn>
+                        </p:par>
+                      </p:childTnLst>
+                    </p:cTn>
+                  </p:par>
+                  <p:par>
+                    <p:cTn id="19" fill="hold">
+                      <p:stCondLst>
+                        <p:cond delay="indefinite"/>
+                      </p:stCondLst>
+                      <p:childTnLst>
+                        <p:par>
+                          <p:cTn id="20" fill="hold">
+                            <p:stCondLst>
+                              <p:cond delay="0"/>
+                            </p:stCondLst>
+                            <p:childTnLst>
+                              <p:par>
+                                <p:cTn id="21" presetID="10" presetClass="exit" presetSubtype="0" fill="hold" nodeType="clickEffect">
                                   <p:stCondLst>
                                     <p:cond delay="0"/>
                                   </p:stCondLst>
                                   <p:childTnLst>
                                     <p:animEffect transition="out" filter="fade">
                                       <p:cBhvr>
-                                        <p:cTn id="18" dur="500"/>
+                                        <p:cTn id="22" dur="500"/>
                                         <p:tgtEl>
                                           <p:spTgt spid="5"/>
                                         </p:tgtEl>
@@ -27141,7 +27211,7 @@
                                     </p:animEffect>
                                     <p:set>
                                       <p:cBhvr>
-                                        <p:cTn id="19" dur="1" fill="hold">
+                                        <p:cTn id="23" dur="1" fill="hold">
                                           <p:stCondLst>
                                             <p:cond delay="499"/>
                                           </p:stCondLst>
@@ -27155,55 +27225,6 @@
                                       </p:cBhvr>
                                       <p:to>
                                         <p:strVal val="hidden"/>
-                                      </p:to>
-                                    </p:set>
-                                  </p:childTnLst>
-                                </p:cTn>
-                              </p:par>
-                            </p:childTnLst>
-                          </p:cTn>
-                        </p:par>
-                      </p:childTnLst>
-                    </p:cTn>
-                  </p:par>
-                  <p:par>
-                    <p:cTn id="20" fill="hold">
-                      <p:stCondLst>
-                        <p:cond delay="indefinite"/>
-                      </p:stCondLst>
-                      <p:childTnLst>
-                        <p:par>
-                          <p:cTn id="21" fill="hold">
-                            <p:stCondLst>
-                              <p:cond delay="0"/>
-                            </p:stCondLst>
-                            <p:childTnLst>
-                              <p:par>
-                                <p:cTn id="22" presetID="1" presetClass="entr" presetSubtype="0" fill="hold" nodeType="clickEffect">
-                                  <p:stCondLst>
-                                    <p:cond delay="0"/>
-                                  </p:stCondLst>
-                                  <p:childTnLst>
-                                    <p:set>
-                                      <p:cBhvr>
-                                        <p:cTn id="23" dur="1" fill="hold">
-                                          <p:stCondLst>
-                                            <p:cond delay="0"/>
-                                          </p:stCondLst>
-                                        </p:cTn>
-                                        <p:tgtEl>
-                                          <p:spTgt spid="3">
-                                            <p:txEl>
-                                              <p:pRg st="2" end="2"/>
-                                            </p:txEl>
-                                          </p:spTgt>
-                                        </p:tgtEl>
-                                        <p:attrNameLst>
-                                          <p:attrName>style.visibility</p:attrName>
-                                        </p:attrNameLst>
-                                      </p:cBhvr>
-                                      <p:to>
-                                        <p:strVal val="visible"/>
                                       </p:to>
                                     </p:set>
                                   </p:childTnLst>
@@ -27391,6 +27412,55 @@
                                           <p:spTgt spid="3">
                                             <p:txEl>
                                               <p:pRg st="6" end="6"/>
+                                            </p:txEl>
+                                          </p:spTgt>
+                                        </p:tgtEl>
+                                        <p:attrNameLst>
+                                          <p:attrName>style.visibility</p:attrName>
+                                        </p:attrNameLst>
+                                      </p:cBhvr>
+                                      <p:to>
+                                        <p:strVal val="visible"/>
+                                      </p:to>
+                                    </p:set>
+                                  </p:childTnLst>
+                                </p:cTn>
+                              </p:par>
+                            </p:childTnLst>
+                          </p:cTn>
+                        </p:par>
+                      </p:childTnLst>
+                    </p:cTn>
+                  </p:par>
+                  <p:par>
+                    <p:cTn id="40" fill="hold">
+                      <p:stCondLst>
+                        <p:cond delay="indefinite"/>
+                      </p:stCondLst>
+                      <p:childTnLst>
+                        <p:par>
+                          <p:cTn id="41" fill="hold">
+                            <p:stCondLst>
+                              <p:cond delay="0"/>
+                            </p:stCondLst>
+                            <p:childTnLst>
+                              <p:par>
+                                <p:cTn id="42" presetID="1" presetClass="entr" presetSubtype="0" fill="hold" nodeType="clickEffect">
+                                  <p:stCondLst>
+                                    <p:cond delay="0"/>
+                                  </p:stCondLst>
+                                  <p:childTnLst>
+                                    <p:set>
+                                      <p:cBhvr>
+                                        <p:cTn id="43" dur="1" fill="hold">
+                                          <p:stCondLst>
+                                            <p:cond delay="0"/>
+                                          </p:stCondLst>
+                                        </p:cTn>
+                                        <p:tgtEl>
+                                          <p:spTgt spid="3">
+                                            <p:txEl>
+                                              <p:pRg st="7" end="7"/>
                                             </p:txEl>
                                           </p:spTgt>
                                         </p:tgtEl>
@@ -34607,7 +34677,15 @@
             </a:r>
             <a:r>
               <a:rPr lang="en-US" sz="2400" dirty="0"/>
-              <a:t>– Noun and start with capital letters.</a:t>
+              <a:t>– Noun and </a:t>
+            </a:r>
+            <a:r>
+              <a:rPr lang="en-US" sz="2400" dirty="0" err="1"/>
+              <a:t>UpperCamelCase</a:t>
+            </a:r>
+            <a:r>
+              <a:rPr lang="en-US" sz="2400" dirty="0"/>
+              <a:t>.</a:t>
             </a:r>
           </a:p>
           <a:p>
@@ -34617,7 +34695,15 @@
             </a:r>
             <a:r>
               <a:rPr lang="en-US" sz="2400" dirty="0"/>
-              <a:t>– Verb with small case. </a:t>
+              <a:t>– Verb and </a:t>
+            </a:r>
+            <a:r>
+              <a:rPr lang="en-US" sz="2400" dirty="0" err="1"/>
+              <a:t>lowerCamelCase</a:t>
+            </a:r>
+            <a:r>
+              <a:rPr lang="en-US" sz="2400" dirty="0"/>
+              <a:t>. </a:t>
             </a:r>
           </a:p>
           <a:p>
@@ -34627,7 +34713,15 @@
             </a:r>
             <a:r>
               <a:rPr lang="en-US" sz="2400" dirty="0"/>
-              <a:t>– short and meaningful.</a:t>
+              <a:t>– short and meaningful and </a:t>
+            </a:r>
+            <a:r>
+              <a:rPr lang="en-US" sz="2400" dirty="0" err="1"/>
+              <a:t>lowerCamelCase</a:t>
+            </a:r>
+            <a:r>
+              <a:rPr lang="en-US" sz="2400" dirty="0"/>
+              <a:t>.</a:t>
             </a:r>
           </a:p>
           <a:p>

</xml_diff>